<commit_message>
koreksi project bagian API
</commit_message>
<xml_diff>
--- a/Mini Project/PPT.pptx
+++ b/Mini Project/PPT.pptx
@@ -5,16 +5,17 @@
     <p:sldMasterId id="2147483648" r:id="rId1"/>
   </p:sldMasterIdLst>
   <p:handoutMasterIdLst>
-    <p:handoutMasterId r:id="rId9"/>
+    <p:handoutMasterId r:id="rId10"/>
   </p:handoutMasterIdLst>
   <p:sldIdLst>
     <p:sldId id="256" r:id="rId2"/>
     <p:sldId id="257" r:id="rId3"/>
     <p:sldId id="258" r:id="rId4"/>
     <p:sldId id="276" r:id="rId5"/>
-    <p:sldId id="278" r:id="rId6"/>
-    <p:sldId id="269" r:id="rId7"/>
-    <p:sldId id="275" r:id="rId8"/>
+    <p:sldId id="279" r:id="rId6"/>
+    <p:sldId id="278" r:id="rId7"/>
+    <p:sldId id="269" r:id="rId8"/>
+    <p:sldId id="275" r:id="rId9"/>
   </p:sldIdLst>
   <p:sldSz cx="12192000" cy="6858000"/>
   <p:notesSz cx="6858000" cy="9144000"/>
@@ -218,7 +219,7 @@
           <a:p>
             <a:fld id="{0D880871-A491-4E0D-B27E-69CC2687082F}" type="datetimeFigureOut">
               <a:rPr lang="en-US" smtClean="0"/>
-              <a:t>4/25/2022</a:t>
+              <a:t>4/26/2022</a:t>
             </a:fld>
             <a:endParaRPr lang="en-US"/>
           </a:p>
@@ -460,7 +461,7 @@
           <a:p>
             <a:fld id="{4791294E-E5A8-4AC0-BC36-C2BA5440625C}" type="datetimeFigureOut">
               <a:rPr lang="en-US" smtClean="0"/>
-              <a:t>4/25/2022</a:t>
+              <a:t>4/26/2022</a:t>
             </a:fld>
             <a:endParaRPr lang="en-US"/>
           </a:p>
@@ -670,7 +671,7 @@
           <a:p>
             <a:fld id="{4791294E-E5A8-4AC0-BC36-C2BA5440625C}" type="datetimeFigureOut">
               <a:rPr lang="en-US" smtClean="0"/>
-              <a:t>4/25/2022</a:t>
+              <a:t>4/26/2022</a:t>
             </a:fld>
             <a:endParaRPr lang="en-US"/>
           </a:p>
@@ -890,7 +891,7 @@
           <a:p>
             <a:fld id="{4791294E-E5A8-4AC0-BC36-C2BA5440625C}" type="datetimeFigureOut">
               <a:rPr lang="en-US" smtClean="0"/>
-              <a:t>4/25/2022</a:t>
+              <a:t>4/26/2022</a:t>
             </a:fld>
             <a:endParaRPr lang="en-US"/>
           </a:p>
@@ -1100,7 +1101,7 @@
           <a:p>
             <a:fld id="{4791294E-E5A8-4AC0-BC36-C2BA5440625C}" type="datetimeFigureOut">
               <a:rPr lang="en-US" smtClean="0"/>
-              <a:t>4/25/2022</a:t>
+              <a:t>4/26/2022</a:t>
             </a:fld>
             <a:endParaRPr lang="en-US"/>
           </a:p>
@@ -1387,7 +1388,7 @@
           <a:p>
             <a:fld id="{4791294E-E5A8-4AC0-BC36-C2BA5440625C}" type="datetimeFigureOut">
               <a:rPr lang="en-US" smtClean="0"/>
-              <a:t>4/25/2022</a:t>
+              <a:t>4/26/2022</a:t>
             </a:fld>
             <a:endParaRPr lang="en-US"/>
           </a:p>
@@ -1664,7 +1665,7 @@
           <a:p>
             <a:fld id="{4791294E-E5A8-4AC0-BC36-C2BA5440625C}" type="datetimeFigureOut">
               <a:rPr lang="en-US" smtClean="0"/>
-              <a:t>4/25/2022</a:t>
+              <a:t>4/26/2022</a:t>
             </a:fld>
             <a:endParaRPr lang="en-US"/>
           </a:p>
@@ -2088,7 +2089,7 @@
           <a:p>
             <a:fld id="{4791294E-E5A8-4AC0-BC36-C2BA5440625C}" type="datetimeFigureOut">
               <a:rPr lang="en-US" smtClean="0"/>
-              <a:t>4/25/2022</a:t>
+              <a:t>4/26/2022</a:t>
             </a:fld>
             <a:endParaRPr lang="en-US"/>
           </a:p>
@@ -2241,7 +2242,7 @@
           <a:p>
             <a:fld id="{4791294E-E5A8-4AC0-BC36-C2BA5440625C}" type="datetimeFigureOut">
               <a:rPr lang="en-US" smtClean="0"/>
-              <a:t>4/25/2022</a:t>
+              <a:t>4/26/2022</a:t>
             </a:fld>
             <a:endParaRPr lang="en-US"/>
           </a:p>
@@ -2366,7 +2367,7 @@
           <a:p>
             <a:fld id="{4791294E-E5A8-4AC0-BC36-C2BA5440625C}" type="datetimeFigureOut">
               <a:rPr lang="en-US" smtClean="0"/>
-              <a:t>4/25/2022</a:t>
+              <a:t>4/26/2022</a:t>
             </a:fld>
             <a:endParaRPr lang="en-US"/>
           </a:p>
@@ -3007,7 +3008,7 @@
           <a:p>
             <a:fld id="{4791294E-E5A8-4AC0-BC36-C2BA5440625C}" type="datetimeFigureOut">
               <a:rPr lang="en-US" smtClean="0"/>
-              <a:t>4/25/2022</a:t>
+              <a:t>4/26/2022</a:t>
             </a:fld>
             <a:endParaRPr lang="en-US"/>
           </a:p>
@@ -3199,7 +3200,7 @@
           <a:p>
             <a:fld id="{4791294E-E5A8-4AC0-BC36-C2BA5440625C}" type="datetimeFigureOut">
               <a:rPr lang="en-US" smtClean="0"/>
-              <a:t>4/25/2022</a:t>
+              <a:t>4/26/2022</a:t>
             </a:fld>
             <a:endParaRPr lang="en-US"/>
           </a:p>
@@ -3452,7 +3453,7 @@
           <a:p>
             <a:fld id="{4791294E-E5A8-4AC0-BC36-C2BA5440625C}" type="datetimeFigureOut">
               <a:rPr lang="en-US" smtClean="0"/>
-              <a:t>4/25/2022</a:t>
+              <a:t>4/26/2022</a:t>
             </a:fld>
             <a:endParaRPr lang="en-US"/>
           </a:p>
@@ -4871,7 +4872,7 @@
               <a:t> </a:t>
             </a:r>
             <a:r>
-              <a:rPr lang="en-US" sz="2400" b="1" dirty="0" err="1">
+              <a:rPr lang="en-US" sz="2400" b="1" dirty="0" err="1" smtClean="0">
                 <a:solidFill>
                   <a:schemeClr val="accent1"/>
                 </a:solidFill>
@@ -7273,15 +7274,7 @@
                   <a:schemeClr val="accent1"/>
                 </a:solidFill>
               </a:rPr>
-              <a:t>Fitur</a:t>
-            </a:r>
-            <a:r>
-              <a:rPr lang="en-US" sz="2800" b="1" dirty="0" err="1" smtClean="0">
-                <a:solidFill>
-                  <a:schemeClr val="accent1"/>
-                </a:solidFill>
-              </a:rPr>
-              <a:t>-Fitur</a:t>
+              <a:t>Fitur-Fitur</a:t>
             </a:r>
             <a:endParaRPr lang="en-US" sz="2800" b="1" dirty="0">
               <a:solidFill>
@@ -11853,8 +11846,8 @@
         </p:nvSpPr>
         <p:spPr>
           <a:xfrm>
-            <a:off x="2940134" y="2221705"/>
-            <a:ext cx="6962775" cy="2409825"/>
+            <a:off x="2940134" y="2221706"/>
+            <a:ext cx="8906725" cy="2162036"/>
           </a:xfrm>
           <a:custGeom>
             <a:avLst/>
@@ -12126,7 +12119,7 @@
         <p:spPr>
           <a:xfrm>
             <a:off x="2940134" y="1392834"/>
-            <a:ext cx="1495922" cy="584775"/>
+            <a:ext cx="3121367" cy="584775"/>
           </a:xfrm>
           <a:prstGeom prst="rect">
             <a:avLst/>
@@ -12145,7 +12138,23 @@
                   <a:schemeClr val="accent2"/>
                 </a:solidFill>
               </a:rPr>
-              <a:t>Tujuan</a:t>
+              <a:t>Latar</a:t>
+            </a:r>
+            <a:r>
+              <a:rPr lang="en-US" sz="3200" b="1" dirty="0" smtClean="0">
+                <a:solidFill>
+                  <a:schemeClr val="accent2"/>
+                </a:solidFill>
+              </a:rPr>
+              <a:t> </a:t>
+            </a:r>
+            <a:r>
+              <a:rPr lang="en-US" sz="3200" b="1" dirty="0" err="1" smtClean="0">
+                <a:solidFill>
+                  <a:schemeClr val="accent2"/>
+                </a:solidFill>
+              </a:rPr>
+              <a:t>Belakang</a:t>
             </a:r>
             <a:endParaRPr lang="en-US" sz="3200" b="1" dirty="0">
               <a:solidFill>
@@ -12170,7 +12179,7 @@
         <p:spPr>
           <a:xfrm>
             <a:off x="2940134" y="2328933"/>
-            <a:ext cx="6669741" cy="1754326"/>
+            <a:ext cx="8691572" cy="1477328"/>
           </a:xfrm>
           <a:prstGeom prst="rect">
             <a:avLst/>
@@ -12182,6 +12191,7 @@
           </a:bodyPr>
           <a:lstStyle/>
           <a:p>
+            <a:pPr algn="just"/>
             <a:r>
               <a:rPr lang="en-US" b="1" dirty="0" err="1" smtClean="0">
                 <a:solidFill>
@@ -12424,6 +12434,7 @@
             </a:r>
           </a:p>
           <a:p>
+            <a:pPr algn="just"/>
             <a:r>
               <a:rPr lang="en-US" b="1" dirty="0" err="1">
                 <a:solidFill>
@@ -12703,6 +12714,7 @@
             </a:endParaRPr>
           </a:p>
           <a:p>
+            <a:pPr algn="just"/>
             <a:endParaRPr lang="en-US" b="1" dirty="0" smtClean="0">
               <a:solidFill>
                 <a:schemeClr val="accent1"/>
@@ -13243,6 +13255,1301 @@
 </file>
 
 <file path=ppt/slides/slide5.xml><?xml version="1.0" encoding="utf-8"?>
+<p:sld xmlns:a="http://schemas.openxmlformats.org/drawingml/2006/main" xmlns:r="http://schemas.openxmlformats.org/officeDocument/2006/relationships" xmlns:p="http://schemas.openxmlformats.org/presentationml/2006/main">
+  <p:cSld>
+    <p:spTree>
+      <p:nvGrpSpPr>
+        <p:cNvPr id="1" name=""/>
+        <p:cNvGrpSpPr/>
+        <p:nvPr/>
+      </p:nvGrpSpPr>
+      <p:grpSpPr>
+        <a:xfrm>
+          <a:off x="0" y="0"/>
+          <a:ext cx="0" cy="0"/>
+          <a:chOff x="0" y="0"/>
+          <a:chExt cx="0" cy="0"/>
+        </a:xfrm>
+      </p:grpSpPr>
+      <p:sp>
+        <p:nvSpPr>
+          <p:cNvPr id="4" name="Freeform: Shape 3">
+            <a:extLst>
+              <a:ext uri="{FF2B5EF4-FFF2-40B4-BE49-F238E27FC236}">
+                <a16:creationId xmlns:a16="http://schemas.microsoft.com/office/drawing/2014/main" id="{7F8C96FF-78D2-4437-8DCA-6C4985C310D7}"/>
+              </a:ext>
+            </a:extLst>
+          </p:cNvPr>
+          <p:cNvSpPr/>
+          <p:nvPr/>
+        </p:nvSpPr>
+        <p:spPr>
+          <a:xfrm>
+            <a:off x="-7144" y="-7144"/>
+            <a:ext cx="2781300" cy="6867525"/>
+          </a:xfrm>
+          <a:custGeom>
+            <a:avLst/>
+            <a:gdLst>
+              <a:gd name="connsiteX0" fmla="*/ 7144 w 2781300"/>
+              <a:gd name="connsiteY0" fmla="*/ 7144 h 6867525"/>
+              <a:gd name="connsiteX1" fmla="*/ 2777109 w 2781300"/>
+              <a:gd name="connsiteY1" fmla="*/ 7144 h 6867525"/>
+              <a:gd name="connsiteX2" fmla="*/ 2777109 w 2781300"/>
+              <a:gd name="connsiteY2" fmla="*/ 6865144 h 6867525"/>
+              <a:gd name="connsiteX3" fmla="*/ 7144 w 2781300"/>
+              <a:gd name="connsiteY3" fmla="*/ 6865144 h 6867525"/>
+            </a:gdLst>
+            <a:ahLst/>
+            <a:cxnLst>
+              <a:cxn ang="0">
+                <a:pos x="connsiteX0" y="connsiteY0"/>
+              </a:cxn>
+              <a:cxn ang="0">
+                <a:pos x="connsiteX1" y="connsiteY1"/>
+              </a:cxn>
+              <a:cxn ang="0">
+                <a:pos x="connsiteX2" y="connsiteY2"/>
+              </a:cxn>
+              <a:cxn ang="0">
+                <a:pos x="connsiteX3" y="connsiteY3"/>
+              </a:cxn>
+            </a:cxnLst>
+            <a:rect l="l" t="t" r="r" b="b"/>
+            <a:pathLst>
+              <a:path w="2781300" h="6867525">
+                <a:moveTo>
+                  <a:pt x="7144" y="7144"/>
+                </a:moveTo>
+                <a:lnTo>
+                  <a:pt x="2777109" y="7144"/>
+                </a:lnTo>
+                <a:lnTo>
+                  <a:pt x="2777109" y="6865144"/>
+                </a:lnTo>
+                <a:lnTo>
+                  <a:pt x="7144" y="6865144"/>
+                </a:lnTo>
+                <a:close/>
+              </a:path>
+            </a:pathLst>
+          </a:custGeom>
+          <a:solidFill>
+            <a:srgbClr val="0A1931"/>
+          </a:solidFill>
+          <a:ln w="9525" cap="flat">
+            <a:noFill/>
+            <a:prstDash val="solid"/>
+            <a:miter/>
+          </a:ln>
+        </p:spPr>
+        <p:txBody>
+          <a:bodyPr rtlCol="0" anchor="ctr"/>
+          <a:lstStyle/>
+          <a:p>
+            <a:endParaRPr lang="en-US"/>
+          </a:p>
+        </p:txBody>
+      </p:sp>
+      <p:sp>
+        <p:nvSpPr>
+          <p:cNvPr id="6" name="Freeform: Shape 5">
+            <a:extLst>
+              <a:ext uri="{FF2B5EF4-FFF2-40B4-BE49-F238E27FC236}">
+                <a16:creationId xmlns:a16="http://schemas.microsoft.com/office/drawing/2014/main" id="{E1FDC9E3-ED9E-46D0-B897-B98E7B917AFD}"/>
+              </a:ext>
+            </a:extLst>
+          </p:cNvPr>
+          <p:cNvSpPr/>
+          <p:nvPr/>
+        </p:nvSpPr>
+        <p:spPr>
+          <a:xfrm>
+            <a:off x="2940134" y="2221705"/>
+            <a:ext cx="6962775" cy="2409825"/>
+          </a:xfrm>
+          <a:custGeom>
+            <a:avLst/>
+            <a:gdLst>
+              <a:gd name="connsiteX0" fmla="*/ 14287 w 6962775"/>
+              <a:gd name="connsiteY0" fmla="*/ 14288 h 2409825"/>
+              <a:gd name="connsiteX1" fmla="*/ 6948678 w 6962775"/>
+              <a:gd name="connsiteY1" fmla="*/ 14288 h 2409825"/>
+              <a:gd name="connsiteX2" fmla="*/ 6948678 w 6962775"/>
+              <a:gd name="connsiteY2" fmla="*/ 2400300 h 2409825"/>
+              <a:gd name="connsiteX3" fmla="*/ 14287 w 6962775"/>
+              <a:gd name="connsiteY3" fmla="*/ 2400300 h 2409825"/>
+            </a:gdLst>
+            <a:ahLst/>
+            <a:cxnLst>
+              <a:cxn ang="0">
+                <a:pos x="connsiteX0" y="connsiteY0"/>
+              </a:cxn>
+              <a:cxn ang="0">
+                <a:pos x="connsiteX1" y="connsiteY1"/>
+              </a:cxn>
+              <a:cxn ang="0">
+                <a:pos x="connsiteX2" y="connsiteY2"/>
+              </a:cxn>
+              <a:cxn ang="0">
+                <a:pos x="connsiteX3" y="connsiteY3"/>
+              </a:cxn>
+            </a:cxnLst>
+            <a:rect l="l" t="t" r="r" b="b"/>
+            <a:pathLst>
+              <a:path w="6962775" h="2409825">
+                <a:moveTo>
+                  <a:pt x="14287" y="14288"/>
+                </a:moveTo>
+                <a:lnTo>
+                  <a:pt x="6948678" y="14288"/>
+                </a:lnTo>
+                <a:lnTo>
+                  <a:pt x="6948678" y="2400300"/>
+                </a:lnTo>
+                <a:lnTo>
+                  <a:pt x="14287" y="2400300"/>
+                </a:lnTo>
+                <a:close/>
+              </a:path>
+            </a:pathLst>
+          </a:custGeom>
+          <a:noFill/>
+          <a:ln w="19050" cap="flat">
+            <a:solidFill>
+              <a:srgbClr val="0A1931"/>
+            </a:solidFill>
+            <a:prstDash val="solid"/>
+            <a:miter/>
+          </a:ln>
+        </p:spPr>
+        <p:txBody>
+          <a:bodyPr rtlCol="0" anchor="ctr"/>
+          <a:lstStyle/>
+          <a:p>
+            <a:endParaRPr lang="en-US"/>
+          </a:p>
+        </p:txBody>
+      </p:sp>
+      <p:sp>
+        <p:nvSpPr>
+          <p:cNvPr id="9" name="Freeform: Shape 8">
+            <a:extLst>
+              <a:ext uri="{FF2B5EF4-FFF2-40B4-BE49-F238E27FC236}">
+                <a16:creationId xmlns:a16="http://schemas.microsoft.com/office/drawing/2014/main" id="{4BE081BF-BE45-4FB8-A782-7E331FFCE2F6}"/>
+              </a:ext>
+            </a:extLst>
+          </p:cNvPr>
+          <p:cNvSpPr/>
+          <p:nvPr/>
+        </p:nvSpPr>
+        <p:spPr>
+          <a:xfrm>
+            <a:off x="3924586" y="6072842"/>
+            <a:ext cx="190500" cy="190500"/>
+          </a:xfrm>
+          <a:custGeom>
+            <a:avLst/>
+            <a:gdLst>
+              <a:gd name="connsiteX0" fmla="*/ 183928 w 190500"/>
+              <a:gd name="connsiteY0" fmla="*/ 95536 h 190500"/>
+              <a:gd name="connsiteX1" fmla="*/ 95536 w 190500"/>
+              <a:gd name="connsiteY1" fmla="*/ 183928 h 190500"/>
+              <a:gd name="connsiteX2" fmla="*/ 7144 w 190500"/>
+              <a:gd name="connsiteY2" fmla="*/ 95536 h 190500"/>
+              <a:gd name="connsiteX3" fmla="*/ 95536 w 190500"/>
+              <a:gd name="connsiteY3" fmla="*/ 7143 h 190500"/>
+              <a:gd name="connsiteX4" fmla="*/ 183928 w 190500"/>
+              <a:gd name="connsiteY4" fmla="*/ 95536 h 190500"/>
+            </a:gdLst>
+            <a:ahLst/>
+            <a:cxnLst>
+              <a:cxn ang="0">
+                <a:pos x="connsiteX0" y="connsiteY0"/>
+              </a:cxn>
+              <a:cxn ang="0">
+                <a:pos x="connsiteX1" y="connsiteY1"/>
+              </a:cxn>
+              <a:cxn ang="0">
+                <a:pos x="connsiteX2" y="connsiteY2"/>
+              </a:cxn>
+              <a:cxn ang="0">
+                <a:pos x="connsiteX3" y="connsiteY3"/>
+              </a:cxn>
+              <a:cxn ang="0">
+                <a:pos x="connsiteX4" y="connsiteY4"/>
+              </a:cxn>
+            </a:cxnLst>
+            <a:rect l="l" t="t" r="r" b="b"/>
+            <a:pathLst>
+              <a:path w="190500" h="190500">
+                <a:moveTo>
+                  <a:pt x="183928" y="95536"/>
+                </a:moveTo>
+                <a:cubicBezTo>
+                  <a:pt x="183928" y="144353"/>
+                  <a:pt x="144353" y="183928"/>
+                  <a:pt x="95536" y="183928"/>
+                </a:cubicBezTo>
+                <a:cubicBezTo>
+                  <a:pt x="46718" y="183928"/>
+                  <a:pt x="7144" y="144354"/>
+                  <a:pt x="7144" y="95536"/>
+                </a:cubicBezTo>
+                <a:cubicBezTo>
+                  <a:pt x="7144" y="46718"/>
+                  <a:pt x="46718" y="7143"/>
+                  <a:pt x="95536" y="7143"/>
+                </a:cubicBezTo>
+                <a:cubicBezTo>
+                  <a:pt x="144353" y="7143"/>
+                  <a:pt x="183928" y="46718"/>
+                  <a:pt x="183928" y="95536"/>
+                </a:cubicBezTo>
+                <a:close/>
+              </a:path>
+            </a:pathLst>
+          </a:custGeom>
+          <a:solidFill>
+            <a:srgbClr val="FFC947"/>
+          </a:solidFill>
+          <a:ln w="9525" cap="flat">
+            <a:noFill/>
+            <a:prstDash val="solid"/>
+            <a:miter/>
+          </a:ln>
+        </p:spPr>
+        <p:txBody>
+          <a:bodyPr rtlCol="0" anchor="ctr"/>
+          <a:lstStyle/>
+          <a:p>
+            <a:endParaRPr lang="en-US"/>
+          </a:p>
+        </p:txBody>
+      </p:sp>
+      <p:sp>
+        <p:nvSpPr>
+          <p:cNvPr id="10" name="Freeform: Shape 9">
+            <a:extLst>
+              <a:ext uri="{FF2B5EF4-FFF2-40B4-BE49-F238E27FC236}">
+                <a16:creationId xmlns:a16="http://schemas.microsoft.com/office/drawing/2014/main" id="{11F9197E-F5F7-4D68-8FB2-5CF62AAFBC67}"/>
+              </a:ext>
+            </a:extLst>
+          </p:cNvPr>
+          <p:cNvSpPr/>
+          <p:nvPr/>
+        </p:nvSpPr>
+        <p:spPr>
+          <a:xfrm>
+            <a:off x="11105579" y="770192"/>
+            <a:ext cx="190500" cy="190500"/>
+          </a:xfrm>
+          <a:custGeom>
+            <a:avLst/>
+            <a:gdLst>
+              <a:gd name="connsiteX0" fmla="*/ 183928 w 190500"/>
+              <a:gd name="connsiteY0" fmla="*/ 95536 h 190500"/>
+              <a:gd name="connsiteX1" fmla="*/ 95535 w 190500"/>
+              <a:gd name="connsiteY1" fmla="*/ 183928 h 190500"/>
+              <a:gd name="connsiteX2" fmla="*/ 7143 w 190500"/>
+              <a:gd name="connsiteY2" fmla="*/ 95536 h 190500"/>
+              <a:gd name="connsiteX3" fmla="*/ 95535 w 190500"/>
+              <a:gd name="connsiteY3" fmla="*/ 7144 h 190500"/>
+              <a:gd name="connsiteX4" fmla="*/ 183928 w 190500"/>
+              <a:gd name="connsiteY4" fmla="*/ 95536 h 190500"/>
+            </a:gdLst>
+            <a:ahLst/>
+            <a:cxnLst>
+              <a:cxn ang="0">
+                <a:pos x="connsiteX0" y="connsiteY0"/>
+              </a:cxn>
+              <a:cxn ang="0">
+                <a:pos x="connsiteX1" y="connsiteY1"/>
+              </a:cxn>
+              <a:cxn ang="0">
+                <a:pos x="connsiteX2" y="connsiteY2"/>
+              </a:cxn>
+              <a:cxn ang="0">
+                <a:pos x="connsiteX3" y="connsiteY3"/>
+              </a:cxn>
+              <a:cxn ang="0">
+                <a:pos x="connsiteX4" y="connsiteY4"/>
+              </a:cxn>
+            </a:cxnLst>
+            <a:rect l="l" t="t" r="r" b="b"/>
+            <a:pathLst>
+              <a:path w="190500" h="190500">
+                <a:moveTo>
+                  <a:pt x="183928" y="95536"/>
+                </a:moveTo>
+                <a:cubicBezTo>
+                  <a:pt x="183928" y="144353"/>
+                  <a:pt x="144353" y="183928"/>
+                  <a:pt x="95535" y="183928"/>
+                </a:cubicBezTo>
+                <a:cubicBezTo>
+                  <a:pt x="46718" y="183928"/>
+                  <a:pt x="7143" y="144353"/>
+                  <a:pt x="7143" y="95536"/>
+                </a:cubicBezTo>
+                <a:cubicBezTo>
+                  <a:pt x="7143" y="46718"/>
+                  <a:pt x="46718" y="7144"/>
+                  <a:pt x="95535" y="7144"/>
+                </a:cubicBezTo>
+                <a:cubicBezTo>
+                  <a:pt x="144353" y="7144"/>
+                  <a:pt x="183928" y="46718"/>
+                  <a:pt x="183928" y="95536"/>
+                </a:cubicBezTo>
+                <a:close/>
+              </a:path>
+            </a:pathLst>
+          </a:custGeom>
+          <a:solidFill>
+            <a:srgbClr val="FFC947"/>
+          </a:solidFill>
+          <a:ln w="9525" cap="flat">
+            <a:noFill/>
+            <a:prstDash val="solid"/>
+            <a:miter/>
+          </a:ln>
+        </p:spPr>
+        <p:txBody>
+          <a:bodyPr rtlCol="0" anchor="ctr"/>
+          <a:lstStyle/>
+          <a:p>
+            <a:endParaRPr lang="en-US"/>
+          </a:p>
+        </p:txBody>
+      </p:sp>
+      <p:sp>
+        <p:nvSpPr>
+          <p:cNvPr id="11" name="TextBox 10">
+            <a:extLst>
+              <a:ext uri="{FF2B5EF4-FFF2-40B4-BE49-F238E27FC236}">
+                <a16:creationId xmlns:a16="http://schemas.microsoft.com/office/drawing/2014/main" id="{1AD15403-861A-47F1-BE64-3B6543AA2854}"/>
+              </a:ext>
+            </a:extLst>
+          </p:cNvPr>
+          <p:cNvSpPr txBox="1"/>
+          <p:nvPr/>
+        </p:nvSpPr>
+        <p:spPr>
+          <a:xfrm>
+            <a:off x="2940134" y="1392834"/>
+            <a:ext cx="1495922" cy="584775"/>
+          </a:xfrm>
+          <a:prstGeom prst="rect">
+            <a:avLst/>
+          </a:prstGeom>
+          <a:noFill/>
+        </p:spPr>
+        <p:txBody>
+          <a:bodyPr wrap="none" rtlCol="0">
+            <a:spAutoFit/>
+          </a:bodyPr>
+          <a:lstStyle/>
+          <a:p>
+            <a:r>
+              <a:rPr lang="en-US" sz="3200" b="1" dirty="0" err="1" smtClean="0">
+                <a:solidFill>
+                  <a:schemeClr val="accent2"/>
+                </a:solidFill>
+              </a:rPr>
+              <a:t>Tujuan</a:t>
+            </a:r>
+            <a:endParaRPr lang="en-US" sz="3200" b="1" dirty="0">
+              <a:solidFill>
+                <a:schemeClr val="accent2"/>
+              </a:solidFill>
+            </a:endParaRPr>
+          </a:p>
+        </p:txBody>
+      </p:sp>
+      <p:sp>
+        <p:nvSpPr>
+          <p:cNvPr id="2" name="Rectangle 1">
+            <a:extLst>
+              <a:ext uri="{FF2B5EF4-FFF2-40B4-BE49-F238E27FC236}">
+                <a16:creationId xmlns:a16="http://schemas.microsoft.com/office/drawing/2014/main" id="{38493CCC-2866-46CB-A818-7FBC3E4D426A}"/>
+              </a:ext>
+            </a:extLst>
+          </p:cNvPr>
+          <p:cNvSpPr/>
+          <p:nvPr/>
+        </p:nvSpPr>
+        <p:spPr>
+          <a:xfrm>
+            <a:off x="2940134" y="2328933"/>
+            <a:ext cx="6669741" cy="1477328"/>
+          </a:xfrm>
+          <a:prstGeom prst="rect">
+            <a:avLst/>
+          </a:prstGeom>
+        </p:spPr>
+        <p:txBody>
+          <a:bodyPr wrap="square">
+            <a:spAutoFit/>
+          </a:bodyPr>
+          <a:lstStyle/>
+          <a:p>
+            <a:pPr marL="342900" indent="-342900">
+              <a:buAutoNum type="alphaLcPeriod"/>
+            </a:pPr>
+            <a:r>
+              <a:rPr lang="en-US" b="1" dirty="0" err="1" smtClean="0">
+                <a:solidFill>
+                  <a:schemeClr val="accent1"/>
+                </a:solidFill>
+              </a:rPr>
+              <a:t>Membuat</a:t>
+            </a:r>
+            <a:r>
+              <a:rPr lang="en-US" b="1" dirty="0" smtClean="0">
+                <a:solidFill>
+                  <a:schemeClr val="accent1"/>
+                </a:solidFill>
+              </a:rPr>
+              <a:t> </a:t>
+            </a:r>
+            <a:r>
+              <a:rPr lang="en-US" b="1" dirty="0" err="1" smtClean="0">
+                <a:solidFill>
+                  <a:schemeClr val="accent1"/>
+                </a:solidFill>
+              </a:rPr>
+              <a:t>aplikasi</a:t>
+            </a:r>
+            <a:r>
+              <a:rPr lang="en-US" b="1" dirty="0" smtClean="0">
+                <a:solidFill>
+                  <a:schemeClr val="accent1"/>
+                </a:solidFill>
+              </a:rPr>
+              <a:t> yang </a:t>
+            </a:r>
+            <a:r>
+              <a:rPr lang="en-US" b="1" dirty="0" err="1" smtClean="0">
+                <a:solidFill>
+                  <a:schemeClr val="accent1"/>
+                </a:solidFill>
+              </a:rPr>
+              <a:t>dapat</a:t>
+            </a:r>
+            <a:r>
+              <a:rPr lang="en-US" b="1" dirty="0" smtClean="0">
+                <a:solidFill>
+                  <a:schemeClr val="accent1"/>
+                </a:solidFill>
+              </a:rPr>
+              <a:t> </a:t>
+            </a:r>
+            <a:r>
+              <a:rPr lang="en-US" b="1" dirty="0" err="1" smtClean="0">
+                <a:solidFill>
+                  <a:schemeClr val="accent1"/>
+                </a:solidFill>
+              </a:rPr>
+              <a:t>menyimpan</a:t>
+            </a:r>
+            <a:r>
+              <a:rPr lang="en-US" b="1" dirty="0" smtClean="0">
+                <a:solidFill>
+                  <a:schemeClr val="accent1"/>
+                </a:solidFill>
+              </a:rPr>
+              <a:t>, </a:t>
+            </a:r>
+            <a:r>
+              <a:rPr lang="en-US" b="1" dirty="0" err="1" smtClean="0">
+                <a:solidFill>
+                  <a:schemeClr val="accent1"/>
+                </a:solidFill>
+              </a:rPr>
+              <a:t>menampilkan</a:t>
+            </a:r>
+            <a:r>
+              <a:rPr lang="en-US" b="1" dirty="0" smtClean="0">
+                <a:solidFill>
+                  <a:schemeClr val="accent1"/>
+                </a:solidFill>
+              </a:rPr>
+              <a:t> data </a:t>
+            </a:r>
+            <a:r>
+              <a:rPr lang="en-US" b="1" dirty="0" err="1" smtClean="0">
+                <a:solidFill>
+                  <a:schemeClr val="accent1"/>
+                </a:solidFill>
+              </a:rPr>
+              <a:t>dan</a:t>
+            </a:r>
+            <a:r>
+              <a:rPr lang="en-US" b="1" dirty="0" smtClean="0">
+                <a:solidFill>
+                  <a:schemeClr val="accent1"/>
+                </a:solidFill>
+              </a:rPr>
+              <a:t> </a:t>
+            </a:r>
+            <a:r>
+              <a:rPr lang="en-US" b="1" dirty="0" err="1" smtClean="0">
+                <a:solidFill>
+                  <a:schemeClr val="accent1"/>
+                </a:solidFill>
+              </a:rPr>
+              <a:t>dapat</a:t>
+            </a:r>
+            <a:r>
+              <a:rPr lang="en-US" b="1" dirty="0" smtClean="0">
+                <a:solidFill>
+                  <a:schemeClr val="accent1"/>
+                </a:solidFill>
+              </a:rPr>
+              <a:t> </a:t>
+            </a:r>
+            <a:r>
+              <a:rPr lang="en-US" b="1" dirty="0" err="1" smtClean="0">
+                <a:solidFill>
+                  <a:schemeClr val="accent1"/>
+                </a:solidFill>
+              </a:rPr>
+              <a:t>memproses</a:t>
+            </a:r>
+            <a:r>
+              <a:rPr lang="en-US" b="1" dirty="0" smtClean="0">
+                <a:solidFill>
+                  <a:schemeClr val="accent1"/>
+                </a:solidFill>
+              </a:rPr>
+              <a:t> data </a:t>
+            </a:r>
+            <a:r>
+              <a:rPr lang="en-US" b="1" dirty="0" err="1" smtClean="0">
+                <a:solidFill>
+                  <a:schemeClr val="accent1"/>
+                </a:solidFill>
+              </a:rPr>
+              <a:t>keuangan</a:t>
+            </a:r>
+            <a:r>
+              <a:rPr lang="en-US" b="1" dirty="0" smtClean="0">
+                <a:solidFill>
+                  <a:schemeClr val="accent1"/>
+                </a:solidFill>
+              </a:rPr>
+              <a:t> </a:t>
+            </a:r>
+            <a:r>
+              <a:rPr lang="en-US" b="1" dirty="0" err="1" smtClean="0">
+                <a:solidFill>
+                  <a:schemeClr val="accent1"/>
+                </a:solidFill>
+              </a:rPr>
+              <a:t>secara</a:t>
+            </a:r>
+            <a:r>
+              <a:rPr lang="en-US" b="1" dirty="0" smtClean="0">
+                <a:solidFill>
+                  <a:schemeClr val="accent1"/>
+                </a:solidFill>
+              </a:rPr>
+              <a:t> </a:t>
+            </a:r>
+            <a:r>
+              <a:rPr lang="en-US" b="1" dirty="0" err="1" smtClean="0">
+                <a:solidFill>
+                  <a:schemeClr val="accent1"/>
+                </a:solidFill>
+              </a:rPr>
+              <a:t>efektif</a:t>
+            </a:r>
+            <a:r>
+              <a:rPr lang="en-US" b="1" dirty="0" smtClean="0">
+                <a:solidFill>
+                  <a:schemeClr val="accent1"/>
+                </a:solidFill>
+              </a:rPr>
+              <a:t>.</a:t>
+            </a:r>
+          </a:p>
+          <a:p>
+            <a:pPr marL="342900" indent="-342900">
+              <a:buAutoNum type="alphaLcPeriod"/>
+            </a:pPr>
+            <a:r>
+              <a:rPr lang="en-US" b="1" dirty="0" err="1" smtClean="0">
+                <a:solidFill>
+                  <a:schemeClr val="accent1"/>
+                </a:solidFill>
+              </a:rPr>
+              <a:t>Membuat</a:t>
+            </a:r>
+            <a:r>
+              <a:rPr lang="en-US" b="1" dirty="0" smtClean="0">
+                <a:solidFill>
+                  <a:schemeClr val="accent1"/>
+                </a:solidFill>
+              </a:rPr>
+              <a:t> </a:t>
+            </a:r>
+            <a:r>
+              <a:rPr lang="en-US" b="1" dirty="0" err="1" smtClean="0">
+                <a:solidFill>
+                  <a:schemeClr val="accent1"/>
+                </a:solidFill>
+              </a:rPr>
+              <a:t>aplikasi</a:t>
+            </a:r>
+            <a:r>
+              <a:rPr lang="en-US" b="1" dirty="0" smtClean="0">
+                <a:solidFill>
+                  <a:schemeClr val="accent1"/>
+                </a:solidFill>
+              </a:rPr>
+              <a:t> yang </a:t>
+            </a:r>
+            <a:r>
+              <a:rPr lang="en-US" b="1" dirty="0" err="1" smtClean="0">
+                <a:solidFill>
+                  <a:schemeClr val="accent1"/>
+                </a:solidFill>
+              </a:rPr>
+              <a:t>mudah</a:t>
+            </a:r>
+            <a:r>
+              <a:rPr lang="en-US" b="1" dirty="0" smtClean="0">
+                <a:solidFill>
+                  <a:schemeClr val="accent1"/>
+                </a:solidFill>
+              </a:rPr>
+              <a:t> </a:t>
+            </a:r>
+            <a:r>
+              <a:rPr lang="en-US" b="1" dirty="0" err="1" smtClean="0">
+                <a:solidFill>
+                  <a:schemeClr val="accent1"/>
+                </a:solidFill>
+              </a:rPr>
+              <a:t>digunakan</a:t>
+            </a:r>
+            <a:r>
+              <a:rPr lang="en-US" b="1" dirty="0" smtClean="0">
+                <a:solidFill>
+                  <a:schemeClr val="accent1"/>
+                </a:solidFill>
+              </a:rPr>
+              <a:t> </a:t>
+            </a:r>
+            <a:r>
+              <a:rPr lang="en-US" b="1" dirty="0" err="1" smtClean="0">
+                <a:solidFill>
+                  <a:schemeClr val="accent1"/>
+                </a:solidFill>
+              </a:rPr>
+              <a:t>dalam</a:t>
+            </a:r>
+            <a:r>
+              <a:rPr lang="en-US" b="1" dirty="0" smtClean="0">
+                <a:solidFill>
+                  <a:schemeClr val="accent1"/>
+                </a:solidFill>
+              </a:rPr>
+              <a:t> </a:t>
+            </a:r>
+            <a:r>
+              <a:rPr lang="en-US" b="1" dirty="0" err="1" smtClean="0">
+                <a:solidFill>
+                  <a:schemeClr val="accent1"/>
+                </a:solidFill>
+              </a:rPr>
+              <a:t>mengatur</a:t>
+            </a:r>
+            <a:r>
+              <a:rPr lang="en-US" b="1" dirty="0" smtClean="0">
+                <a:solidFill>
+                  <a:schemeClr val="accent1"/>
+                </a:solidFill>
+              </a:rPr>
+              <a:t> </a:t>
+            </a:r>
+            <a:r>
+              <a:rPr lang="en-US" b="1" dirty="0" err="1" smtClean="0">
+                <a:solidFill>
+                  <a:schemeClr val="accent1"/>
+                </a:solidFill>
+              </a:rPr>
+              <a:t>keuangan</a:t>
+            </a:r>
+            <a:r>
+              <a:rPr lang="en-US" b="1" dirty="0" smtClean="0">
+                <a:solidFill>
+                  <a:schemeClr val="accent1"/>
+                </a:solidFill>
+              </a:rPr>
+              <a:t> </a:t>
+            </a:r>
+            <a:r>
+              <a:rPr lang="en-US" b="1" dirty="0" err="1" smtClean="0">
+                <a:solidFill>
+                  <a:schemeClr val="accent1"/>
+                </a:solidFill>
+              </a:rPr>
+              <a:t>mahasiswa</a:t>
+            </a:r>
+            <a:r>
+              <a:rPr lang="en-US" b="1" dirty="0" smtClean="0">
+                <a:solidFill>
+                  <a:schemeClr val="accent1"/>
+                </a:solidFill>
+              </a:rPr>
+              <a:t> </a:t>
+            </a:r>
+          </a:p>
+        </p:txBody>
+      </p:sp>
+    </p:spTree>
+    <p:extLst>
+      <p:ext uri="{BB962C8B-B14F-4D97-AF65-F5344CB8AC3E}">
+        <p14:creationId xmlns:p14="http://schemas.microsoft.com/office/powerpoint/2010/main" val="2432257196"/>
+      </p:ext>
+    </p:extLst>
+  </p:cSld>
+  <p:clrMapOvr>
+    <a:masterClrMapping/>
+  </p:clrMapOvr>
+  <mc:AlternateContent xmlns:mc="http://schemas.openxmlformats.org/markup-compatibility/2006" xmlns:p14="http://schemas.microsoft.com/office/powerpoint/2010/main">
+    <mc:Choice Requires="p14">
+      <p:transition spd="med" p14:dur="700">
+        <p:fade/>
+      </p:transition>
+    </mc:Choice>
+    <mc:Fallback xmlns="">
+      <p:transition spd="med">
+        <p:fade/>
+      </p:transition>
+    </mc:Fallback>
+  </mc:AlternateContent>
+  <p:timing>
+    <p:tnLst>
+      <p:par>
+        <p:cTn id="1" dur="indefinite" restart="never" nodeType="tmRoot">
+          <p:childTnLst>
+            <p:seq concurrent="1" nextAc="seek">
+              <p:cTn id="2" dur="indefinite" nodeType="mainSeq">
+                <p:childTnLst>
+                  <p:par>
+                    <p:cTn id="3" fill="hold">
+                      <p:stCondLst>
+                        <p:cond delay="indefinite"/>
+                        <p:cond evt="onBegin" delay="0">
+                          <p:tn val="2"/>
+                        </p:cond>
+                      </p:stCondLst>
+                      <p:childTnLst>
+                        <p:par>
+                          <p:cTn id="4" fill="hold">
+                            <p:stCondLst>
+                              <p:cond delay="0"/>
+                            </p:stCondLst>
+                            <p:childTnLst>
+                              <p:par>
+                                <p:cTn id="5" presetID="2" presetClass="entr" presetSubtype="8" decel="100000" fill="hold" grpId="0" nodeType="withEffect">
+                                  <p:stCondLst>
+                                    <p:cond delay="0"/>
+                                  </p:stCondLst>
+                                  <p:childTnLst>
+                                    <p:set>
+                                      <p:cBhvr>
+                                        <p:cTn id="6" dur="1" fill="hold">
+                                          <p:stCondLst>
+                                            <p:cond delay="0"/>
+                                          </p:stCondLst>
+                                        </p:cTn>
+                                        <p:tgtEl>
+                                          <p:spTgt spid="4"/>
+                                        </p:tgtEl>
+                                        <p:attrNameLst>
+                                          <p:attrName>style.visibility</p:attrName>
+                                        </p:attrNameLst>
+                                      </p:cBhvr>
+                                      <p:to>
+                                        <p:strVal val="visible"/>
+                                      </p:to>
+                                    </p:set>
+                                    <p:anim calcmode="lin" valueType="num">
+                                      <p:cBhvr additive="base">
+                                        <p:cTn id="7" dur="1000" fill="hold"/>
+                                        <p:tgtEl>
+                                          <p:spTgt spid="4"/>
+                                        </p:tgtEl>
+                                        <p:attrNameLst>
+                                          <p:attrName>ppt_x</p:attrName>
+                                        </p:attrNameLst>
+                                      </p:cBhvr>
+                                      <p:tavLst>
+                                        <p:tav tm="0">
+                                          <p:val>
+                                            <p:strVal val="0-#ppt_w/2"/>
+                                          </p:val>
+                                        </p:tav>
+                                        <p:tav tm="100000">
+                                          <p:val>
+                                            <p:strVal val="#ppt_x"/>
+                                          </p:val>
+                                        </p:tav>
+                                      </p:tavLst>
+                                    </p:anim>
+                                    <p:anim calcmode="lin" valueType="num">
+                                      <p:cBhvr additive="base">
+                                        <p:cTn id="8" dur="1000" fill="hold"/>
+                                        <p:tgtEl>
+                                          <p:spTgt spid="4"/>
+                                        </p:tgtEl>
+                                        <p:attrNameLst>
+                                          <p:attrName>ppt_y</p:attrName>
+                                        </p:attrNameLst>
+                                      </p:cBhvr>
+                                      <p:tavLst>
+                                        <p:tav tm="0">
+                                          <p:val>
+                                            <p:strVal val="#ppt_y"/>
+                                          </p:val>
+                                        </p:tav>
+                                        <p:tav tm="100000">
+                                          <p:val>
+                                            <p:strVal val="#ppt_y"/>
+                                          </p:val>
+                                        </p:tav>
+                                      </p:tavLst>
+                                    </p:anim>
+                                  </p:childTnLst>
+                                </p:cTn>
+                              </p:par>
+                              <p:par>
+                                <p:cTn id="9" presetID="53" presetClass="entr" presetSubtype="16" fill="hold" grpId="0" nodeType="withEffect">
+                                  <p:stCondLst>
+                                    <p:cond delay="0"/>
+                                  </p:stCondLst>
+                                  <p:childTnLst>
+                                    <p:set>
+                                      <p:cBhvr>
+                                        <p:cTn id="10" dur="1" fill="hold">
+                                          <p:stCondLst>
+                                            <p:cond delay="0"/>
+                                          </p:stCondLst>
+                                        </p:cTn>
+                                        <p:tgtEl>
+                                          <p:spTgt spid="9"/>
+                                        </p:tgtEl>
+                                        <p:attrNameLst>
+                                          <p:attrName>style.visibility</p:attrName>
+                                        </p:attrNameLst>
+                                      </p:cBhvr>
+                                      <p:to>
+                                        <p:strVal val="visible"/>
+                                      </p:to>
+                                    </p:set>
+                                    <p:anim calcmode="lin" valueType="num">
+                                      <p:cBhvr>
+                                        <p:cTn id="11" dur="500" fill="hold"/>
+                                        <p:tgtEl>
+                                          <p:spTgt spid="9"/>
+                                        </p:tgtEl>
+                                        <p:attrNameLst>
+                                          <p:attrName>ppt_w</p:attrName>
+                                        </p:attrNameLst>
+                                      </p:cBhvr>
+                                      <p:tavLst>
+                                        <p:tav tm="0">
+                                          <p:val>
+                                            <p:fltVal val="0"/>
+                                          </p:val>
+                                        </p:tav>
+                                        <p:tav tm="100000">
+                                          <p:val>
+                                            <p:strVal val="#ppt_w"/>
+                                          </p:val>
+                                        </p:tav>
+                                      </p:tavLst>
+                                    </p:anim>
+                                    <p:anim calcmode="lin" valueType="num">
+                                      <p:cBhvr>
+                                        <p:cTn id="12" dur="500" fill="hold"/>
+                                        <p:tgtEl>
+                                          <p:spTgt spid="9"/>
+                                        </p:tgtEl>
+                                        <p:attrNameLst>
+                                          <p:attrName>ppt_h</p:attrName>
+                                        </p:attrNameLst>
+                                      </p:cBhvr>
+                                      <p:tavLst>
+                                        <p:tav tm="0">
+                                          <p:val>
+                                            <p:fltVal val="0"/>
+                                          </p:val>
+                                        </p:tav>
+                                        <p:tav tm="100000">
+                                          <p:val>
+                                            <p:strVal val="#ppt_h"/>
+                                          </p:val>
+                                        </p:tav>
+                                      </p:tavLst>
+                                    </p:anim>
+                                    <p:animEffect transition="in" filter="fade">
+                                      <p:cBhvr>
+                                        <p:cTn id="13" dur="500"/>
+                                        <p:tgtEl>
+                                          <p:spTgt spid="9"/>
+                                        </p:tgtEl>
+                                      </p:cBhvr>
+                                    </p:animEffect>
+                                  </p:childTnLst>
+                                </p:cTn>
+                              </p:par>
+                              <p:par>
+                                <p:cTn id="14" presetID="53" presetClass="entr" presetSubtype="16" fill="hold" grpId="0" nodeType="withEffect">
+                                  <p:stCondLst>
+                                    <p:cond delay="0"/>
+                                  </p:stCondLst>
+                                  <p:childTnLst>
+                                    <p:set>
+                                      <p:cBhvr>
+                                        <p:cTn id="15" dur="1" fill="hold">
+                                          <p:stCondLst>
+                                            <p:cond delay="0"/>
+                                          </p:stCondLst>
+                                        </p:cTn>
+                                        <p:tgtEl>
+                                          <p:spTgt spid="10"/>
+                                        </p:tgtEl>
+                                        <p:attrNameLst>
+                                          <p:attrName>style.visibility</p:attrName>
+                                        </p:attrNameLst>
+                                      </p:cBhvr>
+                                      <p:to>
+                                        <p:strVal val="visible"/>
+                                      </p:to>
+                                    </p:set>
+                                    <p:anim calcmode="lin" valueType="num">
+                                      <p:cBhvr>
+                                        <p:cTn id="16" dur="500" fill="hold"/>
+                                        <p:tgtEl>
+                                          <p:spTgt spid="10"/>
+                                        </p:tgtEl>
+                                        <p:attrNameLst>
+                                          <p:attrName>ppt_w</p:attrName>
+                                        </p:attrNameLst>
+                                      </p:cBhvr>
+                                      <p:tavLst>
+                                        <p:tav tm="0">
+                                          <p:val>
+                                            <p:fltVal val="0"/>
+                                          </p:val>
+                                        </p:tav>
+                                        <p:tav tm="100000">
+                                          <p:val>
+                                            <p:strVal val="#ppt_w"/>
+                                          </p:val>
+                                        </p:tav>
+                                      </p:tavLst>
+                                    </p:anim>
+                                    <p:anim calcmode="lin" valueType="num">
+                                      <p:cBhvr>
+                                        <p:cTn id="17" dur="500" fill="hold"/>
+                                        <p:tgtEl>
+                                          <p:spTgt spid="10"/>
+                                        </p:tgtEl>
+                                        <p:attrNameLst>
+                                          <p:attrName>ppt_h</p:attrName>
+                                        </p:attrNameLst>
+                                      </p:cBhvr>
+                                      <p:tavLst>
+                                        <p:tav tm="0">
+                                          <p:val>
+                                            <p:fltVal val="0"/>
+                                          </p:val>
+                                        </p:tav>
+                                        <p:tav tm="100000">
+                                          <p:val>
+                                            <p:strVal val="#ppt_h"/>
+                                          </p:val>
+                                        </p:tav>
+                                      </p:tavLst>
+                                    </p:anim>
+                                    <p:animEffect transition="in" filter="fade">
+                                      <p:cBhvr>
+                                        <p:cTn id="18" dur="500"/>
+                                        <p:tgtEl>
+                                          <p:spTgt spid="10"/>
+                                        </p:tgtEl>
+                                      </p:cBhvr>
+                                    </p:animEffect>
+                                  </p:childTnLst>
+                                </p:cTn>
+                              </p:par>
+                              <p:par>
+                                <p:cTn id="19" presetID="2" presetClass="entr" presetSubtype="2" decel="100000" fill="hold" grpId="0" nodeType="withEffect">
+                                  <p:stCondLst>
+                                    <p:cond delay="0"/>
+                                  </p:stCondLst>
+                                  <p:childTnLst>
+                                    <p:set>
+                                      <p:cBhvr>
+                                        <p:cTn id="20" dur="1" fill="hold">
+                                          <p:stCondLst>
+                                            <p:cond delay="0"/>
+                                          </p:stCondLst>
+                                        </p:cTn>
+                                        <p:tgtEl>
+                                          <p:spTgt spid="11"/>
+                                        </p:tgtEl>
+                                        <p:attrNameLst>
+                                          <p:attrName>style.visibility</p:attrName>
+                                        </p:attrNameLst>
+                                      </p:cBhvr>
+                                      <p:to>
+                                        <p:strVal val="visible"/>
+                                      </p:to>
+                                    </p:set>
+                                    <p:anim calcmode="lin" valueType="num">
+                                      <p:cBhvr additive="base">
+                                        <p:cTn id="21" dur="1000" fill="hold"/>
+                                        <p:tgtEl>
+                                          <p:spTgt spid="11"/>
+                                        </p:tgtEl>
+                                        <p:attrNameLst>
+                                          <p:attrName>ppt_x</p:attrName>
+                                        </p:attrNameLst>
+                                      </p:cBhvr>
+                                      <p:tavLst>
+                                        <p:tav tm="0">
+                                          <p:val>
+                                            <p:strVal val="1+#ppt_w/2"/>
+                                          </p:val>
+                                        </p:tav>
+                                        <p:tav tm="100000">
+                                          <p:val>
+                                            <p:strVal val="#ppt_x"/>
+                                          </p:val>
+                                        </p:tav>
+                                      </p:tavLst>
+                                    </p:anim>
+                                    <p:anim calcmode="lin" valueType="num">
+                                      <p:cBhvr additive="base">
+                                        <p:cTn id="22" dur="1000" fill="hold"/>
+                                        <p:tgtEl>
+                                          <p:spTgt spid="11"/>
+                                        </p:tgtEl>
+                                        <p:attrNameLst>
+                                          <p:attrName>ppt_y</p:attrName>
+                                        </p:attrNameLst>
+                                      </p:cBhvr>
+                                      <p:tavLst>
+                                        <p:tav tm="0">
+                                          <p:val>
+                                            <p:strVal val="#ppt_y"/>
+                                          </p:val>
+                                        </p:tav>
+                                        <p:tav tm="100000">
+                                          <p:val>
+                                            <p:strVal val="#ppt_y"/>
+                                          </p:val>
+                                        </p:tav>
+                                      </p:tavLst>
+                                    </p:anim>
+                                  </p:childTnLst>
+                                </p:cTn>
+                              </p:par>
+                              <p:par>
+                                <p:cTn id="23" presetID="21" presetClass="entr" presetSubtype="1" fill="hold" grpId="0" nodeType="withEffect">
+                                  <p:stCondLst>
+                                    <p:cond delay="0"/>
+                                  </p:stCondLst>
+                                  <p:childTnLst>
+                                    <p:set>
+                                      <p:cBhvr>
+                                        <p:cTn id="24" dur="1" fill="hold">
+                                          <p:stCondLst>
+                                            <p:cond delay="0"/>
+                                          </p:stCondLst>
+                                        </p:cTn>
+                                        <p:tgtEl>
+                                          <p:spTgt spid="6"/>
+                                        </p:tgtEl>
+                                        <p:attrNameLst>
+                                          <p:attrName>style.visibility</p:attrName>
+                                        </p:attrNameLst>
+                                      </p:cBhvr>
+                                      <p:to>
+                                        <p:strVal val="visible"/>
+                                      </p:to>
+                                    </p:set>
+                                    <p:animEffect transition="in" filter="wheel(1)">
+                                      <p:cBhvr>
+                                        <p:cTn id="25" dur="1000"/>
+                                        <p:tgtEl>
+                                          <p:spTgt spid="6"/>
+                                        </p:tgtEl>
+                                      </p:cBhvr>
+                                    </p:animEffect>
+                                  </p:childTnLst>
+                                </p:cTn>
+                              </p:par>
+                            </p:childTnLst>
+                          </p:cTn>
+                        </p:par>
+                        <p:par>
+                          <p:cTn id="26" fill="hold">
+                            <p:stCondLst>
+                              <p:cond delay="1000"/>
+                            </p:stCondLst>
+                            <p:childTnLst>
+                              <p:par>
+                                <p:cTn id="27" presetID="22" presetClass="entr" presetSubtype="8" fill="hold" grpId="0" nodeType="afterEffect">
+                                  <p:stCondLst>
+                                    <p:cond delay="0"/>
+                                  </p:stCondLst>
+                                  <p:childTnLst>
+                                    <p:set>
+                                      <p:cBhvr>
+                                        <p:cTn id="28" dur="1" fill="hold">
+                                          <p:stCondLst>
+                                            <p:cond delay="0"/>
+                                          </p:stCondLst>
+                                        </p:cTn>
+                                        <p:tgtEl>
+                                          <p:spTgt spid="2">
+                                            <p:txEl>
+                                              <p:pRg st="0" end="0"/>
+                                            </p:txEl>
+                                          </p:spTgt>
+                                        </p:tgtEl>
+                                        <p:attrNameLst>
+                                          <p:attrName>style.visibility</p:attrName>
+                                        </p:attrNameLst>
+                                      </p:cBhvr>
+                                      <p:to>
+                                        <p:strVal val="visible"/>
+                                      </p:to>
+                                    </p:set>
+                                    <p:animEffect transition="in" filter="wipe(left)">
+                                      <p:cBhvr>
+                                        <p:cTn id="29" dur="250"/>
+                                        <p:tgtEl>
+                                          <p:spTgt spid="2">
+                                            <p:txEl>
+                                              <p:pRg st="0" end="0"/>
+                                            </p:txEl>
+                                          </p:spTgt>
+                                        </p:tgtEl>
+                                      </p:cBhvr>
+                                    </p:animEffect>
+                                  </p:childTnLst>
+                                </p:cTn>
+                              </p:par>
+                            </p:childTnLst>
+                          </p:cTn>
+                        </p:par>
+                      </p:childTnLst>
+                    </p:cTn>
+                  </p:par>
+                  <p:par>
+                    <p:cTn id="30" fill="hold">
+                      <p:stCondLst>
+                        <p:cond delay="indefinite"/>
+                      </p:stCondLst>
+                      <p:childTnLst>
+                        <p:par>
+                          <p:cTn id="31" fill="hold">
+                            <p:stCondLst>
+                              <p:cond delay="0"/>
+                            </p:stCondLst>
+                            <p:childTnLst>
+                              <p:par>
+                                <p:cTn id="32" presetID="22" presetClass="entr" presetSubtype="8" fill="hold" grpId="0" nodeType="clickEffect">
+                                  <p:stCondLst>
+                                    <p:cond delay="0"/>
+                                  </p:stCondLst>
+                                  <p:childTnLst>
+                                    <p:set>
+                                      <p:cBhvr>
+                                        <p:cTn id="33" dur="1" fill="hold">
+                                          <p:stCondLst>
+                                            <p:cond delay="0"/>
+                                          </p:stCondLst>
+                                        </p:cTn>
+                                        <p:tgtEl>
+                                          <p:spTgt spid="2">
+                                            <p:txEl>
+                                              <p:pRg st="1" end="1"/>
+                                            </p:txEl>
+                                          </p:spTgt>
+                                        </p:tgtEl>
+                                        <p:attrNameLst>
+                                          <p:attrName>style.visibility</p:attrName>
+                                        </p:attrNameLst>
+                                      </p:cBhvr>
+                                      <p:to>
+                                        <p:strVal val="visible"/>
+                                      </p:to>
+                                    </p:set>
+                                    <p:animEffect transition="in" filter="wipe(left)">
+                                      <p:cBhvr>
+                                        <p:cTn id="34" dur="250"/>
+                                        <p:tgtEl>
+                                          <p:spTgt spid="2">
+                                            <p:txEl>
+                                              <p:pRg st="1" end="1"/>
+                                            </p:txEl>
+                                          </p:spTgt>
+                                        </p:tgtEl>
+                                      </p:cBhvr>
+                                    </p:animEffect>
+                                  </p:childTnLst>
+                                </p:cTn>
+                              </p:par>
+                            </p:childTnLst>
+                          </p:cTn>
+                        </p:par>
+                      </p:childTnLst>
+                    </p:cTn>
+                  </p:par>
+                </p:childTnLst>
+              </p:cTn>
+              <p:prevCondLst>
+                <p:cond evt="onPrev" delay="0">
+                  <p:tgtEl>
+                    <p:sldTgt/>
+                  </p:tgtEl>
+                </p:cond>
+              </p:prevCondLst>
+              <p:nextCondLst>
+                <p:cond evt="onNext" delay="0">
+                  <p:tgtEl>
+                    <p:sldTgt/>
+                  </p:tgtEl>
+                </p:cond>
+              </p:nextCondLst>
+            </p:seq>
+          </p:childTnLst>
+        </p:cTn>
+      </p:par>
+    </p:tnLst>
+    <p:bldLst>
+      <p:bldP spid="4" grpId="0" animBg="1"/>
+      <p:bldP spid="6" grpId="0" animBg="1"/>
+      <p:bldP spid="9" grpId="0" animBg="1"/>
+      <p:bldP spid="10" grpId="0" animBg="1"/>
+      <p:bldP spid="11" grpId="0"/>
+      <p:bldP spid="2" grpId="0" uiExpand="1" build="p"/>
+    </p:bldLst>
+  </p:timing>
+</p:sld>
+</file>
+
+<file path=ppt/slides/slide6.xml><?xml version="1.0" encoding="utf-8"?>
 <p:sld xmlns:a="http://schemas.openxmlformats.org/drawingml/2006/main" xmlns:r="http://schemas.openxmlformats.org/officeDocument/2006/relationships" xmlns:p="http://schemas.openxmlformats.org/presentationml/2006/main">
   <p:cSld>
     <p:spTree>
@@ -14948,7 +16255,7 @@
 </p:sld>
 </file>
 
-<file path=ppt/slides/slide6.xml><?xml version="1.0" encoding="utf-8"?>
+<file path=ppt/slides/slide7.xml><?xml version="1.0" encoding="utf-8"?>
 <p:sld xmlns:a="http://schemas.openxmlformats.org/drawingml/2006/main" xmlns:r="http://schemas.openxmlformats.org/officeDocument/2006/relationships" xmlns:p="http://schemas.openxmlformats.org/presentationml/2006/main">
   <p:cSld>
     <p:spTree>
@@ -18296,6 +19603,67 @@
           </a:p>
         </p:txBody>
       </p:sp>
+      <p:sp>
+        <p:nvSpPr>
+          <p:cNvPr id="35" name="TextBox 34">
+            <a:extLst>
+              <a:ext uri="{FF2B5EF4-FFF2-40B4-BE49-F238E27FC236}">
+                <a16:creationId xmlns:a16="http://schemas.microsoft.com/office/drawing/2014/main" id="{B23D1CC5-6FE8-445B-A15E-B911518C4610}"/>
+              </a:ext>
+            </a:extLst>
+          </p:cNvPr>
+          <p:cNvSpPr txBox="1"/>
+          <p:nvPr/>
+        </p:nvSpPr>
+        <p:spPr>
+          <a:xfrm>
+            <a:off x="7668881" y="4398168"/>
+            <a:ext cx="2613216" cy="461665"/>
+          </a:xfrm>
+          <a:prstGeom prst="rect">
+            <a:avLst/>
+          </a:prstGeom>
+          <a:noFill/>
+        </p:spPr>
+        <p:txBody>
+          <a:bodyPr wrap="none" rtlCol="0">
+            <a:spAutoFit/>
+          </a:bodyPr>
+          <a:lstStyle/>
+          <a:p>
+            <a:pPr algn="r"/>
+            <a:r>
+              <a:rPr lang="en-US" sz="2400" b="1" dirty="0" err="1" smtClean="0">
+                <a:solidFill>
+                  <a:schemeClr val="accent2"/>
+                </a:solidFill>
+              </a:rPr>
+              <a:t>Catatan</a:t>
+            </a:r>
+            <a:r>
+              <a:rPr lang="en-US" sz="2400" b="1" dirty="0" smtClean="0">
+                <a:solidFill>
+                  <a:schemeClr val="accent2"/>
+                </a:solidFill>
+              </a:rPr>
+              <a:t> </a:t>
+            </a:r>
+            <a:r>
+              <a:rPr lang="en-US" sz="2400" b="1" dirty="0" err="1" smtClean="0">
+                <a:solidFill>
+                  <a:schemeClr val="accent2"/>
+                </a:solidFill>
+              </a:rPr>
+              <a:t>Bulanan</a:t>
+            </a:r>
+            <a:endParaRPr lang="en-US" sz="2400" b="1" dirty="0">
+              <a:solidFill>
+                <a:schemeClr val="accent2"/>
+              </a:solidFill>
+            </a:endParaRPr>
+          </a:p>
+        </p:txBody>
+      </p:sp>
     </p:spTree>
     <p:extLst>
       <p:ext uri="{BB962C8B-B14F-4D97-AF65-F5344CB8AC3E}">
@@ -19441,7 +20809,7 @@
 </p:sld>
 </file>
 
-<file path=ppt/slides/slide7.xml><?xml version="1.0" encoding="utf-8"?>
+<file path=ppt/slides/slide8.xml><?xml version="1.0" encoding="utf-8"?>
 <p:sld xmlns:a="http://schemas.openxmlformats.org/drawingml/2006/main" xmlns:r="http://schemas.openxmlformats.org/officeDocument/2006/relationships" xmlns:p="http://schemas.openxmlformats.org/presentationml/2006/main">
   <p:cSld>
     <p:spTree>

</xml_diff>